<commit_message>
Update labs and slides
</commit_message>
<xml_diff>
--- a/Documents/QA Powerpoints/Module 2.pptx
+++ b/Documents/QA Powerpoints/Module 2.pptx
@@ -1136,7 +1136,12 @@
             <p:ph type="sldImg"/>
           </p:nvPr>
         </p:nvSpPr>
-        <p:spPr/>
+        <p:spPr>
+          <a:xfrm>
+            <a:off x="571500" y="581025"/>
+            <a:ext cx="5715000" cy="3216275"/>
+          </a:xfrm>
+        </p:spPr>
       </p:sp>
       <p:sp>
         <p:nvSpPr>
@@ -1153,7 +1158,21 @@
           <a:bodyPr/>
           <a:lstStyle/>
           <a:p>
-            <a:endParaRPr lang="en-GB"/>
+            <a:r>
+              <a:rPr lang="en-GB" dirty="0" smtClean="0"/>
+              <a:t>Make sure to use Nuget to refer to SDK </a:t>
+            </a:r>
+            <a:r>
+              <a:rPr lang="en-GB" dirty="0" err="1" smtClean="0"/>
+              <a:t>dll’s</a:t>
+            </a:r>
+            <a:r>
+              <a:rPr lang="en-GB" dirty="0" smtClean="0"/>
+              <a:t>.</a:t>
+            </a:r>
+          </a:p>
+          <a:p>
+            <a:endParaRPr lang="en-GB" dirty="0"/>
           </a:p>
         </p:txBody>
       </p:sp>
@@ -1428,41 +1447,48 @@
           </a:p>
           <a:p>
             <a:r>
-              <a:rPr lang="en-GB" baseline="0" dirty="0" smtClean="0"/>
-              <a:t>Add references to the SDK DLLs, from the SDK 2015\bin</a:t>
-            </a:r>
-            <a:r>
-              <a:rPr lang="en-GB" dirty="0" smtClean="0"/>
-              <a:t> folder</a:t>
-            </a:r>
-            <a:r>
-              <a:rPr lang="en-GB" baseline="0" dirty="0" smtClean="0"/>
-              <a:t> (</a:t>
-            </a:r>
-            <a:r>
-              <a:rPr lang="en-US" dirty="0" err="1" smtClean="0"/>
+              <a:rPr lang="en-GB" strike="sngStrike" baseline="0" dirty="0" smtClean="0"/>
+              <a:t>Add references to the SDK DLLs, from the SDK 2015\bin folder (</a:t>
+            </a:r>
+            <a:r>
+              <a:rPr lang="en-US" strike="sngStrike" baseline="0" dirty="0" err="1" smtClean="0"/>
               <a:t>Microsoft.Xrm.Sdk</a:t>
             </a:r>
             <a:r>
-              <a:rPr lang="en-US" dirty="0" smtClean="0"/>
+              <a:rPr lang="en-US" strike="sngStrike" baseline="0" dirty="0" smtClean="0"/>
               <a:t>, </a:t>
             </a:r>
             <a:r>
-              <a:rPr lang="en-US" dirty="0" err="1" smtClean="0"/>
+              <a:rPr lang="en-US" strike="sngStrike" baseline="0" dirty="0" err="1" smtClean="0"/>
               <a:t>Microsoft.Crm.Sdk.Proxy</a:t>
             </a:r>
             <a:r>
-              <a:rPr lang="en-US" dirty="0" smtClean="0"/>
+              <a:rPr lang="en-US" strike="sngStrike" baseline="0" dirty="0" smtClean="0"/>
               <a:t>, </a:t>
             </a:r>
             <a:r>
-              <a:rPr lang="en-US" dirty="0" err="1" smtClean="0"/>
+              <a:rPr lang="en-US" strike="sngStrike" baseline="0" dirty="0" err="1" smtClean="0"/>
               <a:t>Microsoft.Xrm.Client</a:t>
             </a:r>
             <a:r>
-              <a:rPr lang="en-US" dirty="0" smtClean="0"/>
+              <a:rPr lang="en-US" strike="sngStrike" baseline="0" dirty="0" smtClean="0"/>
               <a:t>)</a:t>
             </a:r>
+          </a:p>
+          <a:p>
+            <a:r>
+              <a:rPr lang="en-US" b="1" dirty="0" smtClean="0"/>
+              <a:t>Use reference to nuget</a:t>
+            </a:r>
+            <a:r>
+              <a:rPr lang="en-US" b="1" baseline="0" dirty="0" smtClean="0"/>
+              <a:t> package </a:t>
+            </a:r>
+            <a:r>
+              <a:rPr lang="en-US" b="1" baseline="0" dirty="0" err="1" smtClean="0"/>
+              <a:t>Microsoft.CrmSdk.CoreAssemblies</a:t>
+            </a:r>
+            <a:endParaRPr lang="en-US" b="1" dirty="0" smtClean="0"/>
           </a:p>
           <a:p>
             <a:endParaRPr lang="en-US" dirty="0" smtClean="0"/>
@@ -3656,8 +3682,13 @@
           <a:p>
             <a:r>
               <a:rPr lang="en-GB" dirty="0" smtClean="0"/>
-              <a:t>But Late bound fields as attributes of entity</a:t>
-            </a:r>
+              <a:t>But Late bound fields as attributes of </a:t>
+            </a:r>
+            <a:r>
+              <a:rPr lang="en-GB" dirty="0" smtClean="0"/>
+              <a:t>entity </a:t>
+            </a:r>
+            <a:endParaRPr lang="en-GB" dirty="0" smtClean="0"/>
           </a:p>
           <a:p>
             <a:r>
@@ -3745,8 +3776,64 @@
             </a:r>
             <a:r>
               <a:rPr lang="en-GB" dirty="0" smtClean="0"/>
-              <a:t>(lead);</a:t>
-            </a:r>
+              <a:t>(lead</a:t>
+            </a:r>
+            <a:r>
+              <a:rPr lang="en-GB" dirty="0" smtClean="0"/>
+              <a:t>);</a:t>
+            </a:r>
+          </a:p>
+          <a:p>
+            <a:endParaRPr lang="en-GB" dirty="0" smtClean="0"/>
+          </a:p>
+          <a:p>
+            <a:r>
+              <a:rPr lang="en-GB" dirty="0" smtClean="0"/>
+              <a:t>Or use the</a:t>
+            </a:r>
+            <a:r>
+              <a:rPr lang="en-GB" baseline="0" dirty="0" smtClean="0"/>
+              <a:t> generic function </a:t>
+            </a:r>
+            <a:r>
+              <a:rPr lang="en-GB" baseline="0" dirty="0" err="1" smtClean="0"/>
+              <a:t>getAttributeValue</a:t>
+            </a:r>
+            <a:r>
+              <a:rPr lang="en-GB" baseline="0" dirty="0" smtClean="0"/>
+              <a:t>&lt;&gt;()to return a typed value.</a:t>
+            </a:r>
+          </a:p>
+          <a:p>
+            <a:r>
+              <a:rPr lang="en-GB" baseline="0" dirty="0" err="1" smtClean="0"/>
+              <a:t>Lead.getAttributeValue</a:t>
+            </a:r>
+            <a:r>
+              <a:rPr lang="en-GB" baseline="0" dirty="0" smtClean="0"/>
+              <a:t>&lt;</a:t>
+            </a:r>
+            <a:r>
+              <a:rPr lang="en-GB" baseline="0" dirty="0" err="1" smtClean="0"/>
+              <a:t>int</a:t>
+            </a:r>
+            <a:r>
+              <a:rPr lang="en-GB" baseline="0" dirty="0" smtClean="0"/>
+              <a:t>&gt;(“</a:t>
+            </a:r>
+            <a:r>
+              <a:rPr lang="en-GB" baseline="0" dirty="0" err="1" smtClean="0"/>
+              <a:t>numberofemployees</a:t>
+            </a:r>
+            <a:r>
+              <a:rPr lang="en-GB" baseline="0" dirty="0" smtClean="0"/>
+              <a:t>) // </a:t>
+            </a:r>
+            <a:r>
+              <a:rPr lang="en-GB" baseline="0" dirty="0" err="1" smtClean="0"/>
+              <a:t>int</a:t>
+            </a:r>
+            <a:endParaRPr lang="en-GB" dirty="0" smtClean="0"/>
           </a:p>
           <a:p>
             <a:endParaRPr lang="en-GB" dirty="0" smtClean="0"/>
@@ -5261,6 +5348,17 @@
             <a:endParaRPr lang="en-US" dirty="0" smtClean="0"/>
           </a:p>
           <a:p>
+            <a:endParaRPr lang="en-GB" dirty="0" smtClean="0"/>
+          </a:p>
+          <a:p>
+            <a:r>
+              <a:rPr lang="en-GB" dirty="0" smtClean="0"/>
+              <a:t>Update issues – avoid sending updates that set</a:t>
+            </a:r>
+            <a:r>
+              <a:rPr lang="en-GB" baseline="0" dirty="0" smtClean="0"/>
+              <a:t> values without actually changing them – this can cause unexpected side effects.</a:t>
+            </a:r>
             <a:endParaRPr lang="en-GB" dirty="0"/>
           </a:p>
         </p:txBody>
@@ -5305,7 +5403,12 @@
             <p:ph type="sldImg"/>
           </p:nvPr>
         </p:nvSpPr>
-        <p:spPr/>
+        <p:spPr>
+          <a:xfrm>
+            <a:off x="571500" y="581025"/>
+            <a:ext cx="5715000" cy="3216275"/>
+          </a:xfrm>
+        </p:spPr>
       </p:sp>
       <p:sp>
         <p:nvSpPr>
@@ -11932,33 +12035,54 @@
             </a:r>
           </a:p>
           <a:p>
-            <a:r>
-              <a:rPr lang="en-GB" dirty="0" smtClean="0"/>
-              <a:t>To use the </a:t>
-            </a:r>
-            <a:r>
-              <a:rPr lang="en-GB" b="1" dirty="0" err="1" smtClean="0"/>
+            <a:endParaRPr lang="en-GB" dirty="0" smtClean="0"/>
+          </a:p>
+          <a:p>
+            <a:r>
+              <a:rPr lang="en-GB" b="1" u="sng" dirty="0" smtClean="0"/>
+              <a:t>USE NUGET</a:t>
+            </a:r>
+            <a:r>
+              <a:rPr lang="en-GB" b="1" u="sng" baseline="0" dirty="0" smtClean="0"/>
+              <a:t> to access SDK DLLs</a:t>
+            </a:r>
+            <a:endParaRPr lang="en-GB" b="1" u="sng" dirty="0" smtClean="0"/>
+          </a:p>
+          <a:p>
+            <a:endParaRPr lang="en-GB" dirty="0" smtClean="0"/>
+          </a:p>
+          <a:p>
+            <a:r>
+              <a:rPr lang="en-GB" strike="sngStrike" baseline="0" dirty="0" smtClean="0"/>
+              <a:t>To </a:t>
+            </a:r>
+            <a:r>
+              <a:rPr lang="en-GB" strike="sngStrike" baseline="0" dirty="0" smtClean="0"/>
+              <a:t>use the </a:t>
+            </a:r>
+            <a:r>
+              <a:rPr lang="en-GB" b="1" strike="sngStrike" baseline="0" dirty="0" err="1" smtClean="0"/>
               <a:t>IOrganizationService</a:t>
             </a:r>
             <a:r>
-              <a:rPr lang="en-GB" dirty="0" smtClean="0"/>
+              <a:rPr lang="en-GB" strike="sngStrike" baseline="0" dirty="0" smtClean="0"/>
               <a:t> web service, add a reference to the Microsoft.Xrm.Sdk.dll assembly to your Microsoft Visual Studio project. To access the non-core </a:t>
             </a:r>
             <a:r>
-              <a:rPr lang="en-GB" dirty="0" err="1" smtClean="0"/>
+              <a:rPr lang="en-GB" strike="sngStrike" baseline="0" dirty="0" err="1" smtClean="0"/>
               <a:t>xRM</a:t>
             </a:r>
             <a:r>
-              <a:rPr lang="en-GB" dirty="0" smtClean="0"/>
+              <a:rPr lang="en-GB" strike="sngStrike" baseline="0" dirty="0" smtClean="0"/>
               <a:t> messages, add a reference to the Microsoft.Crm.Sdk.Proxy.dll assembly to your project also. Alternatively, add the service reference to your project. More information: </a:t>
             </a:r>
             <a:r>
-              <a:rPr lang="en-GB" dirty="0" smtClean="0">
+              <a:rPr lang="en-GB" strike="sngStrike" baseline="0" dirty="0" smtClean="0">
                 <a:hlinkClick r:id="rId4"/>
               </a:rPr>
               <a:t>Download the endpoints using the Microsoft Dynamics 365 Developer resources page</a:t>
             </a:r>
-            <a:endParaRPr lang="en-GB" dirty="0" smtClean="0"/>
+            <a:endParaRPr lang="en-GB" strike="sngStrike" baseline="0" dirty="0" smtClean="0"/>
           </a:p>
           <a:p>
             <a:endParaRPr lang="en-GB" dirty="0" smtClean="0"/>
@@ -15180,11 +15304,7 @@
           <a:p>
             <a:r>
               <a:rPr lang="en-GB" dirty="0" smtClean="0"/>
-              <a:t>Module </a:t>
-            </a:r>
-            <a:r>
-              <a:rPr lang="en-GB" dirty="0" smtClean="0"/>
-              <a:t>2</a:t>
+              <a:t>Module 2</a:t>
             </a:r>
             <a:endParaRPr lang="en-GB" dirty="0"/>
           </a:p>
@@ -15740,6 +15860,13 @@
   <p:clrMapOvr>
     <a:masterClrMapping/>
   </p:clrMapOvr>
+  <p:timing>
+    <p:tnLst>
+      <p:par>
+        <p:cTn id="1" dur="indefinite" restart="never" nodeType="tmRoot"/>
+      </p:par>
+    </p:tnLst>
+  </p:timing>
 </p:sld>
 </file>
 
@@ -15805,8 +15932,60 @@
             <a:pPr lvl="1"/>
             <a:r>
               <a:rPr lang="en-GB" dirty="0"/>
-              <a:t>Provides built-in diagnostic tracing and performance reporting</a:t>
-            </a:r>
+              <a:t>Provides built-in diagnostic tracing and performance </a:t>
+            </a:r>
+            <a:r>
+              <a:rPr lang="en-GB" dirty="0" smtClean="0"/>
+              <a:t>reporting</a:t>
+            </a:r>
+          </a:p>
+          <a:p>
+            <a:pPr lvl="1"/>
+            <a:endParaRPr lang="en-GB" dirty="0"/>
+          </a:p>
+          <a:p>
+            <a:pPr lvl="1"/>
+            <a:r>
+              <a:rPr lang="en-GB" dirty="0"/>
+              <a:t>Use </a:t>
+            </a:r>
+            <a:r>
+              <a:rPr lang="en-GB" dirty="0" smtClean="0"/>
+              <a:t>nuget </a:t>
+            </a:r>
+            <a:r>
+              <a:rPr lang="en-GB" dirty="0"/>
+              <a:t>packages in </a:t>
+            </a:r>
+            <a:r>
+              <a:rPr lang="en-GB" dirty="0" err="1"/>
+              <a:t>Microsoft.CrmSdk</a:t>
+            </a:r>
+            <a:r>
+              <a:rPr lang="en-GB" dirty="0"/>
+              <a:t> and </a:t>
+            </a:r>
+            <a:r>
+              <a:rPr lang="en-GB" dirty="0" err="1" smtClean="0"/>
+              <a:t>Microsoft.CrmSdk.XrmTooling</a:t>
+            </a:r>
+            <a:r>
+              <a:rPr lang="en-GB" dirty="0" smtClean="0"/>
+              <a:t> </a:t>
+            </a:r>
+            <a:r>
+              <a:rPr lang="en-GB" dirty="0"/>
+              <a:t>namespaces as </a:t>
+            </a:r>
+            <a:r>
+              <a:rPr lang="en-GB" dirty="0" smtClean="0"/>
+              <a:t>required to access the Tooling Connector library</a:t>
+            </a:r>
+            <a:endParaRPr lang="en-GB" dirty="0"/>
+          </a:p>
+          <a:p>
+            <a:pPr lvl="1"/>
+            <a:endParaRPr lang="en-GB" dirty="0"/>
           </a:p>
           <a:p>
             <a:endParaRPr lang="en-GB" dirty="0"/>
@@ -15884,17 +16063,32 @@
           <a:lstStyle/>
           <a:p>
             <a:r>
-              <a:rPr lang="en-GB" dirty="0"/>
+              <a:rPr lang="en-GB" strike="sngStrike" dirty="0"/>
               <a:t>Set a reference to the tooling connector library (</a:t>
             </a:r>
             <a:r>
-              <a:rPr lang="en-GB" dirty="0" err="1"/>
+              <a:rPr lang="en-GB" strike="sngStrike" dirty="0" err="1"/>
               <a:t>sdk</a:t>
             </a:r>
             <a:r>
-              <a:rPr lang="en-GB" dirty="0"/>
+              <a:rPr lang="en-GB" strike="sngStrike" dirty="0" smtClean="0"/>
               <a:t>)</a:t>
             </a:r>
+          </a:p>
+          <a:p>
+            <a:r>
+              <a:rPr lang="en-GB" dirty="0" smtClean="0"/>
+              <a:t>Use Nuget to refer to </a:t>
+            </a:r>
+            <a:r>
+              <a:rPr lang="en-GB" dirty="0" err="1" smtClean="0"/>
+              <a:t>Microsoft.CrmSdk.XrmTooling.CoreAssembly</a:t>
+            </a:r>
+            <a:r>
+              <a:rPr lang="en-GB" dirty="0" smtClean="0"/>
+              <a:t> package</a:t>
+            </a:r>
+            <a:endParaRPr lang="en-GB" dirty="0"/>
           </a:p>
           <a:p>
             <a:r>
@@ -15909,7 +16103,6 @@
               <a:rPr lang="en-GB" dirty="0"/>
               <a:t> file)</a:t>
             </a:r>
-            <a:endParaRPr lang="en-GB" dirty="0"/>
           </a:p>
         </p:txBody>
       </p:sp>
@@ -16867,7 +17060,6 @@
               <a:rPr lang="en-GB" dirty="0"/>
               <a:t>Convert Lab A solution over to use the tooling connector</a:t>
             </a:r>
-            <a:endParaRPr lang="en-GB" dirty="0"/>
           </a:p>
         </p:txBody>
       </p:sp>
@@ -17266,7 +17458,6 @@
               <a:rPr lang="en-GB" dirty="0"/>
               <a:t> browser or access a copy shipped with the Dynamics 365 SDK</a:t>
             </a:r>
-            <a:endParaRPr lang="en-GB" dirty="0"/>
           </a:p>
         </p:txBody>
       </p:sp>
@@ -17395,7 +17586,6 @@
               <a:rPr lang="en-US" dirty="0"/>
               <a:t>Compare CRUD operation techniques</a:t>
             </a:r>
-            <a:endParaRPr lang="en-US" dirty="0"/>
           </a:p>
         </p:txBody>
       </p:sp>
@@ -17898,9 +18088,6 @@
               </a:rPr>
               <a:t>Schema name is usually uppercase for system types used</a:t>
             </a:r>
-            <a:endParaRPr lang="en-GB" sz="2000" dirty="0">
-              <a:cs typeface="Segoe UI" panose="020B0502040204020203" pitchFamily="34" charset="0"/>
-            </a:endParaRPr>
           </a:p>
         </p:txBody>
       </p:sp>
@@ -18007,7 +18194,6 @@
               <a:rPr lang="en-GB" dirty="0"/>
               <a:t>operations</a:t>
             </a:r>
-            <a:endParaRPr lang="en-GB" dirty="0"/>
           </a:p>
         </p:txBody>
       </p:sp>
@@ -18874,7 +19060,7 @@
           <a:bodyPr/>
           <a:lstStyle/>
           <a:p>
-            <a:endParaRPr lang="en-GB"/>
+            <a:endParaRPr lang="en-GB" dirty="0"/>
           </a:p>
         </p:txBody>
       </p:sp>
@@ -19642,7 +19828,11 @@
           <a:p>
             <a:r>
               <a:rPr lang="en-GB" b="1" dirty="0" smtClean="0"/>
-              <a:t>Late Bound</a:t>
+              <a:t>Early </a:t>
+            </a:r>
+            <a:r>
+              <a:rPr lang="en-GB" b="1" dirty="0" smtClean="0"/>
+              <a:t>Bound</a:t>
             </a:r>
             <a:endParaRPr lang="en-GB" b="1" dirty="0"/>
           </a:p>
@@ -20086,7 +20276,7 @@
           <a:bodyPr/>
           <a:lstStyle/>
           <a:p>
-            <a:endParaRPr lang="en-GB"/>
+            <a:endParaRPr lang="en-GB" dirty="0"/>
           </a:p>
         </p:txBody>
       </p:sp>
@@ -20190,7 +20380,7 @@
           <a:bodyPr/>
           <a:lstStyle/>
           <a:p>
-            <a:endParaRPr lang="en-GB"/>
+            <a:endParaRPr lang="en-GB" dirty="0"/>
           </a:p>
         </p:txBody>
       </p:sp>
@@ -21849,7 +22039,6 @@
               <a:rPr lang="en-GB" dirty="0"/>
               <a:t>, from data type mismatches, Referential Integrity violations, records to be modified being already deleted, etc.</a:t>
             </a:r>
-            <a:endParaRPr lang="en-GB" dirty="0"/>
           </a:p>
         </p:txBody>
       </p:sp>
@@ -23373,7 +23562,6 @@
               <a:rPr lang="en-GB" dirty="0"/>
               <a:t> ascending select c;</a:t>
             </a:r>
-            <a:endParaRPr lang="en-GB" dirty="0"/>
           </a:p>
         </p:txBody>
       </p:sp>
@@ -23913,9 +24101,54 @@
             </a:r>
             <a:r>
               <a:rPr lang="en-US" dirty="0"/>
-              <a:t> and generation of SOAP messages</a:t>
-            </a:r>
+              <a:t> and generation of SOAP </a:t>
+            </a:r>
+            <a:r>
+              <a:rPr lang="en-US" dirty="0" smtClean="0"/>
+              <a:t>messages</a:t>
+            </a:r>
+          </a:p>
+          <a:p>
             <a:endParaRPr lang="en-US" dirty="0"/>
+          </a:p>
+          <a:p>
+            <a:r>
+              <a:rPr lang="en-US" b="1" u="dbl" dirty="0" smtClean="0">
+                <a:uFill>
+                  <a:solidFill>
+                    <a:schemeClr val="accent4"/>
+                  </a:solidFill>
+                </a:uFill>
+              </a:rPr>
+              <a:t>Warning – highly recommended to use nuget from Visual Studio to include required SDK .</a:t>
+            </a:r>
+            <a:r>
+              <a:rPr lang="en-US" b="1" u="dbl" dirty="0" err="1" smtClean="0">
+                <a:uFill>
+                  <a:solidFill>
+                    <a:schemeClr val="accent4"/>
+                  </a:solidFill>
+                </a:uFill>
+              </a:rPr>
+              <a:t>dlls</a:t>
+            </a:r>
+            <a:r>
+              <a:rPr lang="en-US" b="1" u="dbl" dirty="0" smtClean="0">
+                <a:uFill>
+                  <a:solidFill>
+                    <a:schemeClr val="accent4"/>
+                  </a:solidFill>
+                </a:uFill>
+              </a:rPr>
+              <a:t>.</a:t>
+            </a:r>
+            <a:endParaRPr lang="en-US" b="1" u="dbl" dirty="0">
+              <a:uFill>
+                <a:solidFill>
+                  <a:schemeClr val="accent4"/>
+                </a:solidFill>
+              </a:uFill>
+            </a:endParaRPr>
           </a:p>
         </p:txBody>
       </p:sp>
@@ -23954,6 +24187,13 @@
   <p:clrMapOvr>
     <a:masterClrMapping/>
   </p:clrMapOvr>
+  <p:timing>
+    <p:tnLst>
+      <p:par>
+        <p:cTn id="1" dur="indefinite" restart="never" nodeType="tmRoot"/>
+      </p:par>
+    </p:tnLst>
+  </p:timing>
 </p:sld>
 </file>
 
@@ -24126,7 +24366,6 @@
               <a:rPr lang="en-US" dirty="0"/>
               <a:t>Saved Views</a:t>
             </a:r>
-            <a:endParaRPr lang="en-US" dirty="0"/>
           </a:p>
         </p:txBody>
       </p:sp>
@@ -25214,7 +25453,6 @@
               <a:rPr lang="en-US" dirty="0"/>
               <a:t>Can adjust setting On-Premise, not Online</a:t>
             </a:r>
-            <a:endParaRPr lang="en-US" dirty="0"/>
           </a:p>
         </p:txBody>
       </p:sp>
@@ -25327,11 +25565,11 @@
   <p:clrMapOvr>
     <a:masterClrMapping/>
   </p:clrMapOvr>
-  <mc:AlternateContent xmlns:mc="http://schemas.openxmlformats.org/markup-compatibility/2006">
-    <mc:Choice xmlns:p14="http://schemas.microsoft.com/office/powerpoint/2010/main" Requires="p14">
+  <mc:AlternateContent xmlns:mc="http://schemas.openxmlformats.org/markup-compatibility/2006" xmlns:p14="http://schemas.microsoft.com/office/powerpoint/2010/main">
+    <mc:Choice Requires="p14">
       <p:transition spd="slow" p14:dur="2000"/>
     </mc:Choice>
-    <mc:Fallback>
+    <mc:Fallback xmlns="">
       <p:transition spd="slow"/>
     </mc:Fallback>
   </mc:AlternateContent>
@@ -26843,6 +27081,13 @@
   <p:clrMapOvr>
     <a:masterClrMapping/>
   </p:clrMapOvr>
+  <p:timing>
+    <p:tnLst>
+      <p:par>
+        <p:cTn id="1" dur="indefinite" restart="never" nodeType="tmRoot"/>
+      </p:par>
+    </p:tnLst>
+  </p:timing>
 </p:sld>
 </file>
 
@@ -27080,7 +27325,7 @@
 </file>
 
 <file path=ppt/slides/slide7.xml><?xml version="1.0" encoding="utf-8"?>
-<p:sld xmlns:a="http://schemas.openxmlformats.org/drawingml/2006/main" xmlns:r="http://schemas.openxmlformats.org/officeDocument/2006/relationships" xmlns:p="http://schemas.openxmlformats.org/presentationml/2006/main" show="0">
+<p:sld xmlns:a="http://schemas.openxmlformats.org/drawingml/2006/main" xmlns:r="http://schemas.openxmlformats.org/officeDocument/2006/relationships" xmlns:p="http://schemas.openxmlformats.org/presentationml/2006/main">
   <p:cSld>
     <p:spTree>
       <p:nvGrpSpPr>
@@ -27124,33 +27369,75 @@
           </a:p>
           <a:p>
             <a:r>
-              <a:rPr lang="en-GB" dirty="0"/>
+              <a:rPr lang="en-GB" strike="sngStrike" dirty="0"/>
               <a:t>To use the </a:t>
             </a:r>
             <a:r>
-              <a:rPr lang="en-GB" dirty="0" err="1"/>
+              <a:rPr lang="en-GB" strike="sngStrike" dirty="0" err="1"/>
               <a:t>IOrganizationService</a:t>
             </a:r>
             <a:r>
-              <a:rPr lang="en-GB" dirty="0"/>
+              <a:rPr lang="en-GB" strike="sngStrike" dirty="0"/>
               <a:t> web service, add a reference to the Microsoft.Xrm.Sdk.dll assembly to your Microsoft Visual Studio project</a:t>
             </a:r>
           </a:p>
           <a:p>
             <a:r>
-              <a:rPr lang="en-GB" dirty="0"/>
+              <a:rPr lang="en-GB" strike="sngStrike" dirty="0"/>
               <a:t>To access the non-core </a:t>
             </a:r>
             <a:r>
-              <a:rPr lang="en-GB" dirty="0" err="1"/>
+              <a:rPr lang="en-GB" strike="sngStrike" dirty="0" err="1"/>
               <a:t>xRM</a:t>
             </a:r>
             <a:r>
-              <a:rPr lang="en-GB" dirty="0"/>
+              <a:rPr lang="en-GB" strike="sngStrike" dirty="0"/>
               <a:t> messages, add a reference to the Microsoft.Crm.Sdk.Proxy.dll assembly to your project </a:t>
             </a:r>
           </a:p>
           <a:p>
+            <a:r>
+              <a:rPr lang="en-GB" dirty="0" smtClean="0"/>
+              <a:t>Warning – use Nuget - </a:t>
+            </a:r>
+            <a:r>
+              <a:rPr lang="en-GB" dirty="0" err="1" smtClean="0"/>
+              <a:t>Microsoft.CrmSdk.CoreAssemblies</a:t>
+            </a:r>
+            <a:r>
+              <a:rPr lang="en-GB" dirty="0" smtClean="0"/>
+              <a:t> to get core SDK </a:t>
+            </a:r>
+            <a:r>
+              <a:rPr lang="en-GB" dirty="0" err="1" smtClean="0"/>
+              <a:t>dlls</a:t>
+            </a:r>
+            <a:r>
+              <a:rPr lang="en-GB" dirty="0" smtClean="0"/>
+              <a:t>.</a:t>
+            </a:r>
+          </a:p>
+          <a:p>
+            <a:r>
+              <a:rPr lang="en-GB" dirty="0" smtClean="0"/>
+              <a:t>Use other nuget packages in </a:t>
+            </a:r>
+            <a:r>
+              <a:rPr lang="en-GB" dirty="0" err="1" smtClean="0"/>
+              <a:t>Microsoft.CrmSdk</a:t>
+            </a:r>
+            <a:r>
+              <a:rPr lang="en-GB" dirty="0" smtClean="0"/>
+              <a:t> and </a:t>
+            </a:r>
+            <a:r>
+              <a:rPr lang="en-GB" dirty="0" err="1" smtClean="0"/>
+              <a:t>Microsoft.CrmSdk.XrmTooling</a:t>
+            </a:r>
+            <a:r>
+              <a:rPr lang="en-GB" dirty="0" smtClean="0"/>
+              <a:t> namespaces as required.</a:t>
+            </a:r>
             <a:endParaRPr lang="en-GB" dirty="0"/>
           </a:p>
         </p:txBody>
@@ -27198,6 +27485,13 @@
       <p:transition spd="slow"/>
     </mc:Fallback>
   </mc:AlternateContent>
+  <p:timing>
+    <p:tnLst>
+      <p:par>
+        <p:cTn id="1" dur="indefinite" restart="never" nodeType="tmRoot"/>
+      </p:par>
+    </p:tnLst>
+  </p:timing>
 </p:sld>
 </file>
 
@@ -27623,6 +27917,13 @@
   <p:clrMapOvr>
     <a:masterClrMapping/>
   </p:clrMapOvr>
+  <p:timing>
+    <p:tnLst>
+      <p:par>
+        <p:cTn id="1" dur="indefinite" restart="never" nodeType="tmRoot"/>
+      </p:par>
+    </p:tnLst>
+  </p:timing>
 </p:sld>
 </file>
 
@@ -28081,6 +28382,13 @@
   <p:clrMapOvr>
     <a:masterClrMapping/>
   </p:clrMapOvr>
+  <p:timing>
+    <p:tnLst>
+      <p:par>
+        <p:cTn id="1" dur="indefinite" restart="never" nodeType="tmRoot"/>
+      </p:par>
+    </p:tnLst>
+  </p:timing>
 </p:sld>
 </file>
 

</xml_diff>